<commit_message>
Modified 06.php-bacics-4 presentation and examples
</commit_message>
<xml_diff>
--- a/06.php-bacics-4.pptx
+++ b/06.php-bacics-4.pptx
@@ -8,6 +8,9 @@
     <p:sldId id="256" r:id="rId2"/>
     <p:sldId id="257" r:id="rId3"/>
     <p:sldId id="258" r:id="rId4"/>
+    <p:sldId id="259" r:id="rId5"/>
+    <p:sldId id="260" r:id="rId6"/>
+    <p:sldId id="261" r:id="rId7"/>
   </p:sldIdLst>
   <p:sldSz cx="12192000" cy="6858000"/>
   <p:notesSz cx="6858000" cy="9144000"/>
@@ -6197,11 +6200,7 @@
           <a:p>
             <a:r>
               <a:rPr lang="bg-BG" dirty="0" smtClean="0"/>
-              <a:t>ЧАСТ </a:t>
-            </a:r>
-            <a:r>
-              <a:rPr lang="bg-BG" dirty="0" smtClean="0"/>
-              <a:t>четвърта</a:t>
+              <a:t>ЧАСТ четвърта</a:t>
             </a:r>
             <a:endParaRPr lang="en-US" dirty="0"/>
           </a:p>
@@ -6409,6 +6408,297 @@
     <p:extLst>
       <p:ext uri="{BB962C8B-B14F-4D97-AF65-F5344CB8AC3E}">
         <p14:creationId xmlns:p14="http://schemas.microsoft.com/office/powerpoint/2010/main" val="3668142461"/>
+      </p:ext>
+    </p:extLst>
+  </p:cSld>
+  <p:clrMapOvr>
+    <a:masterClrMapping/>
+  </p:clrMapOvr>
+</p:sld>
+</file>
+
+<file path=ppt/slides/slide4.xml><?xml version="1.0" encoding="utf-8"?>
+<p:sld xmlns:a="http://schemas.openxmlformats.org/drawingml/2006/main" xmlns:r="http://schemas.openxmlformats.org/officeDocument/2006/relationships" xmlns:p="http://schemas.openxmlformats.org/presentationml/2006/main">
+  <p:cSld>
+    <p:spTree>
+      <p:nvGrpSpPr>
+        <p:cNvPr id="1" name=""/>
+        <p:cNvGrpSpPr/>
+        <p:nvPr/>
+      </p:nvGrpSpPr>
+      <p:grpSpPr>
+        <a:xfrm>
+          <a:off x="0" y="0"/>
+          <a:ext cx="0" cy="0"/>
+          <a:chOff x="0" y="0"/>
+          <a:chExt cx="0" cy="0"/>
+        </a:xfrm>
+      </p:grpSpPr>
+      <p:sp>
+        <p:nvSpPr>
+          <p:cNvPr id="2" name="Title 1"/>
+          <p:cNvSpPr>
+            <a:spLocks noGrp="1"/>
+          </p:cNvSpPr>
+          <p:nvPr>
+            <p:ph type="title"/>
+          </p:nvPr>
+        </p:nvSpPr>
+        <p:spPr/>
+        <p:txBody>
+          <a:bodyPr/>
+          <a:lstStyle/>
+          <a:p>
+            <a:r>
+              <a:rPr lang="bg-BG" dirty="0" smtClean="0"/>
+              <a:t>Функции в </a:t>
+            </a:r>
+            <a:r>
+              <a:rPr lang="en-US" dirty="0" err="1" smtClean="0"/>
+              <a:t>php</a:t>
+            </a:r>
+            <a:endParaRPr lang="en-US" dirty="0"/>
+          </a:p>
+        </p:txBody>
+      </p:sp>
+      <p:sp>
+        <p:nvSpPr>
+          <p:cNvPr id="3" name="Content Placeholder 2"/>
+          <p:cNvSpPr>
+            <a:spLocks noGrp="1"/>
+          </p:cNvSpPr>
+          <p:nvPr>
+            <p:ph sz="quarter" idx="13"/>
+          </p:nvPr>
+        </p:nvSpPr>
+        <p:spPr/>
+        <p:txBody>
+          <a:bodyPr/>
+          <a:lstStyle/>
+          <a:p>
+            <a:r>
+              <a:rPr lang="bg-BG" dirty="0" smtClean="0"/>
+              <a:t>Функциите представляват именувани парчета код</a:t>
+            </a:r>
+          </a:p>
+          <a:p>
+            <a:r>
+              <a:rPr lang="bg-BG" dirty="0" smtClean="0"/>
+              <a:t>С помощта на функциите се </a:t>
+            </a:r>
+            <a:r>
+              <a:rPr lang="bg-BG" dirty="0" err="1" smtClean="0"/>
+              <a:t>преизползва</a:t>
+            </a:r>
+            <a:r>
+              <a:rPr lang="bg-BG" dirty="0" smtClean="0"/>
+              <a:t> дадена функционалност</a:t>
+            </a:r>
+          </a:p>
+          <a:p>
+            <a:r>
+              <a:rPr lang="bg-BG" dirty="0" smtClean="0"/>
+              <a:t>Помагат за организацията на кода</a:t>
+            </a:r>
+            <a:endParaRPr lang="en-US" dirty="0"/>
+          </a:p>
+        </p:txBody>
+      </p:sp>
+    </p:spTree>
+    <p:extLst>
+      <p:ext uri="{BB962C8B-B14F-4D97-AF65-F5344CB8AC3E}">
+        <p14:creationId xmlns:p14="http://schemas.microsoft.com/office/powerpoint/2010/main" val="1247735933"/>
+      </p:ext>
+    </p:extLst>
+  </p:cSld>
+  <p:clrMapOvr>
+    <a:masterClrMapping/>
+  </p:clrMapOvr>
+</p:sld>
+</file>
+
+<file path=ppt/slides/slide5.xml><?xml version="1.0" encoding="utf-8"?>
+<p:sld xmlns:a="http://schemas.openxmlformats.org/drawingml/2006/main" xmlns:r="http://schemas.openxmlformats.org/officeDocument/2006/relationships" xmlns:p="http://schemas.openxmlformats.org/presentationml/2006/main">
+  <p:cSld>
+    <p:spTree>
+      <p:nvGrpSpPr>
+        <p:cNvPr id="1" name=""/>
+        <p:cNvGrpSpPr/>
+        <p:nvPr/>
+      </p:nvGrpSpPr>
+      <p:grpSpPr>
+        <a:xfrm>
+          <a:off x="0" y="0"/>
+          <a:ext cx="0" cy="0"/>
+          <a:chOff x="0" y="0"/>
+          <a:chExt cx="0" cy="0"/>
+        </a:xfrm>
+      </p:grpSpPr>
+      <p:sp>
+        <p:nvSpPr>
+          <p:cNvPr id="2" name="Title 1"/>
+          <p:cNvSpPr>
+            <a:spLocks noGrp="1"/>
+          </p:cNvSpPr>
+          <p:nvPr>
+            <p:ph type="title"/>
+          </p:nvPr>
+        </p:nvSpPr>
+        <p:spPr>
+          <a:xfrm>
+            <a:off x="913775" y="618517"/>
+            <a:ext cx="10364451" cy="844523"/>
+          </a:xfrm>
+        </p:spPr>
+        <p:txBody>
+          <a:bodyPr/>
+          <a:lstStyle/>
+          <a:p>
+            <a:r>
+              <a:rPr lang="bg-BG" dirty="0" smtClean="0"/>
+              <a:t>Функции демо</a:t>
+            </a:r>
+            <a:endParaRPr lang="en-US" dirty="0"/>
+          </a:p>
+        </p:txBody>
+      </p:sp>
+      <p:pic>
+        <p:nvPicPr>
+          <p:cNvPr id="1026" name="Picture 2" descr="http://monovektor.com/wp-content/uploads/2012/08/1000px-Function_machine2-590x564.png"/>
+          <p:cNvPicPr>
+            <a:picLocks noChangeAspect="1" noChangeArrowheads="1"/>
+          </p:cNvPicPr>
+          <p:nvPr/>
+        </p:nvPicPr>
+        <p:blipFill>
+          <a:blip r:embed="rId2">
+            <a:extLst>
+              <a:ext uri="{28A0092B-C50C-407E-A947-70E740481C1C}">
+                <a14:useLocalDpi xmlns:a14="http://schemas.microsoft.com/office/drawing/2010/main" val="0"/>
+              </a:ext>
+            </a:extLst>
+          </a:blip>
+          <a:srcRect/>
+          <a:stretch>
+            <a:fillRect/>
+          </a:stretch>
+        </p:blipFill>
+        <p:spPr bwMode="auto">
+          <a:xfrm>
+            <a:off x="4101473" y="2214694"/>
+            <a:ext cx="3989054" cy="3813265"/>
+          </a:xfrm>
+          <a:prstGeom prst="rect">
+            <a:avLst/>
+          </a:prstGeom>
+          <a:noFill/>
+          <a:extLst>
+            <a:ext uri="{909E8E84-426E-40DD-AFC4-6F175D3DCCD1}">
+              <a14:hiddenFill xmlns:a14="http://schemas.microsoft.com/office/drawing/2010/main">
+                <a:solidFill>
+                  <a:srgbClr val="FFFFFF"/>
+                </a:solidFill>
+              </a14:hiddenFill>
+            </a:ext>
+          </a:extLst>
+        </p:spPr>
+      </p:pic>
+    </p:spTree>
+    <p:extLst>
+      <p:ext uri="{BB962C8B-B14F-4D97-AF65-F5344CB8AC3E}">
+        <p14:creationId xmlns:p14="http://schemas.microsoft.com/office/powerpoint/2010/main" val="330931026"/>
+      </p:ext>
+    </p:extLst>
+  </p:cSld>
+  <p:clrMapOvr>
+    <a:masterClrMapping/>
+  </p:clrMapOvr>
+</p:sld>
+</file>
+
+<file path=ppt/slides/slide6.xml><?xml version="1.0" encoding="utf-8"?>
+<p:sld xmlns:a="http://schemas.openxmlformats.org/drawingml/2006/main" xmlns:r="http://schemas.openxmlformats.org/officeDocument/2006/relationships" xmlns:p="http://schemas.openxmlformats.org/presentationml/2006/main">
+  <p:cSld>
+    <p:spTree>
+      <p:nvGrpSpPr>
+        <p:cNvPr id="1" name=""/>
+        <p:cNvGrpSpPr/>
+        <p:nvPr/>
+      </p:nvGrpSpPr>
+      <p:grpSpPr>
+        <a:xfrm>
+          <a:off x="0" y="0"/>
+          <a:ext cx="0" cy="0"/>
+          <a:chOff x="0" y="0"/>
+          <a:chExt cx="0" cy="0"/>
+        </a:xfrm>
+      </p:grpSpPr>
+      <p:sp>
+        <p:nvSpPr>
+          <p:cNvPr id="2" name="Title 1"/>
+          <p:cNvSpPr>
+            <a:spLocks noGrp="1"/>
+          </p:cNvSpPr>
+          <p:nvPr>
+            <p:ph type="title"/>
+          </p:nvPr>
+        </p:nvSpPr>
+        <p:spPr/>
+        <p:txBody>
+          <a:bodyPr/>
+          <a:lstStyle/>
+          <a:p>
+            <a:r>
+              <a:rPr lang="bg-BG" dirty="0" smtClean="0"/>
+              <a:t>Параметри на функции в </a:t>
+            </a:r>
+            <a:r>
+              <a:rPr lang="en-US" dirty="0" err="1" smtClean="0"/>
+              <a:t>php</a:t>
+            </a:r>
+            <a:endParaRPr lang="en-US" dirty="0"/>
+          </a:p>
+        </p:txBody>
+      </p:sp>
+      <p:sp>
+        <p:nvSpPr>
+          <p:cNvPr id="3" name="Content Placeholder 2"/>
+          <p:cNvSpPr>
+            <a:spLocks noGrp="1"/>
+          </p:cNvSpPr>
+          <p:nvPr>
+            <p:ph sz="quarter" idx="13"/>
+          </p:nvPr>
+        </p:nvSpPr>
+        <p:spPr/>
+        <p:txBody>
+          <a:bodyPr/>
+          <a:lstStyle/>
+          <a:p>
+            <a:r>
+              <a:rPr lang="bg-BG" dirty="0" smtClean="0"/>
+              <a:t>Функциите могат да приемат параметри</a:t>
+            </a:r>
+          </a:p>
+          <a:p>
+            <a:r>
+              <a:rPr lang="bg-BG" dirty="0" smtClean="0"/>
+              <a:t>Параметрите могат да имат стойност по подразбиране</a:t>
+            </a:r>
+          </a:p>
+          <a:p>
+            <a:r>
+              <a:rPr lang="bg-BG" dirty="0" smtClean="0"/>
+              <a:t>Параметрите се декларират при дефинирането на съответната функция</a:t>
+            </a:r>
+            <a:endParaRPr lang="en-US" dirty="0"/>
+          </a:p>
+        </p:txBody>
+      </p:sp>
+    </p:spTree>
+    <p:extLst>
+      <p:ext uri="{BB962C8B-B14F-4D97-AF65-F5344CB8AC3E}">
+        <p14:creationId xmlns:p14="http://schemas.microsoft.com/office/powerpoint/2010/main" val="620052525"/>
       </p:ext>
     </p:extLst>
   </p:cSld>

</xml_diff>

<commit_message>
Finalized 06.php-bacics-4 lection and examples
</commit_message>
<xml_diff>
--- a/06.php-bacics-4.pptx
+++ b/06.php-bacics-4.pptx
@@ -11,6 +11,22 @@
     <p:sldId id="259" r:id="rId5"/>
     <p:sldId id="260" r:id="rId6"/>
     <p:sldId id="261" r:id="rId7"/>
+    <p:sldId id="262" r:id="rId8"/>
+    <p:sldId id="263" r:id="rId9"/>
+    <p:sldId id="264" r:id="rId10"/>
+    <p:sldId id="265" r:id="rId11"/>
+    <p:sldId id="266" r:id="rId12"/>
+    <p:sldId id="267" r:id="rId13"/>
+    <p:sldId id="268" r:id="rId14"/>
+    <p:sldId id="269" r:id="rId15"/>
+    <p:sldId id="270" r:id="rId16"/>
+    <p:sldId id="271" r:id="rId17"/>
+    <p:sldId id="272" r:id="rId18"/>
+    <p:sldId id="274" r:id="rId19"/>
+    <p:sldId id="273" r:id="rId20"/>
+    <p:sldId id="275" r:id="rId21"/>
+    <p:sldId id="276" r:id="rId22"/>
+    <p:sldId id="277" r:id="rId23"/>
   </p:sldIdLst>
   <p:sldSz cx="12192000" cy="6858000"/>
   <p:notesSz cx="6858000" cy="9144000"/>
@@ -288,7 +304,7 @@
           <a:p>
             <a:fld id="{8E57C33F-FC88-4120-B878-9148FF06A660}" type="datetimeFigureOut">
               <a:rPr lang="en-US" smtClean="0"/>
-              <a:t>11/30/2014</a:t>
+              <a:t>12/1/2014</a:t>
             </a:fld>
             <a:endParaRPr lang="en-US"/>
           </a:p>
@@ -600,7 +616,7 @@
           <a:p>
             <a:fld id="{8E57C33F-FC88-4120-B878-9148FF06A660}" type="datetimeFigureOut">
               <a:rPr lang="en-US" smtClean="0"/>
-              <a:t>11/30/2014</a:t>
+              <a:t>12/1/2014</a:t>
             </a:fld>
             <a:endParaRPr lang="en-US"/>
           </a:p>
@@ -822,7 +838,7 @@
           <a:p>
             <a:fld id="{8E57C33F-FC88-4120-B878-9148FF06A660}" type="datetimeFigureOut">
               <a:rPr lang="en-US" smtClean="0"/>
-              <a:t>11/30/2014</a:t>
+              <a:t>12/1/2014</a:t>
             </a:fld>
             <a:endParaRPr lang="en-US"/>
           </a:p>
@@ -1113,7 +1129,7 @@
           <a:p>
             <a:fld id="{8E57C33F-FC88-4120-B878-9148FF06A660}" type="datetimeFigureOut">
               <a:rPr lang="en-US" smtClean="0"/>
-              <a:t>11/30/2014</a:t>
+              <a:t>12/1/2014</a:t>
             </a:fld>
             <a:endParaRPr lang="en-US"/>
           </a:p>
@@ -1567,7 +1583,7 @@
           <a:p>
             <a:fld id="{8E57C33F-FC88-4120-B878-9148FF06A660}" type="datetimeFigureOut">
               <a:rPr lang="en-US" smtClean="0"/>
-              <a:t>11/30/2014</a:t>
+              <a:t>12/1/2014</a:t>
             </a:fld>
             <a:endParaRPr lang="en-US"/>
           </a:p>
@@ -2143,7 +2159,7 @@
           <a:p>
             <a:fld id="{8E57C33F-FC88-4120-B878-9148FF06A660}" type="datetimeFigureOut">
               <a:rPr lang="en-US" smtClean="0"/>
-              <a:t>11/30/2014</a:t>
+              <a:t>12/1/2014</a:t>
             </a:fld>
             <a:endParaRPr lang="en-US"/>
           </a:p>
@@ -2995,7 +3011,7 @@
           <a:p>
             <a:fld id="{8E57C33F-FC88-4120-B878-9148FF06A660}" type="datetimeFigureOut">
               <a:rPr lang="en-US" smtClean="0"/>
-              <a:t>11/30/2014</a:t>
+              <a:t>12/1/2014</a:t>
             </a:fld>
             <a:endParaRPr lang="en-US"/>
           </a:p>
@@ -3200,7 +3216,7 @@
           <a:p>
             <a:fld id="{8E57C33F-FC88-4120-B878-9148FF06A660}" type="datetimeFigureOut">
               <a:rPr lang="en-US" smtClean="0"/>
-              <a:t>11/30/2014</a:t>
+              <a:t>12/1/2014</a:t>
             </a:fld>
             <a:endParaRPr lang="en-US"/>
           </a:p>
@@ -3414,7 +3430,7 @@
           <a:p>
             <a:fld id="{8E57C33F-FC88-4120-B878-9148FF06A660}" type="datetimeFigureOut">
               <a:rPr lang="en-US" smtClean="0"/>
-              <a:t>11/30/2014</a:t>
+              <a:t>12/1/2014</a:t>
             </a:fld>
             <a:endParaRPr lang="en-US"/>
           </a:p>
@@ -3619,7 +3635,7 @@
           <a:p>
             <a:fld id="{8E57C33F-FC88-4120-B878-9148FF06A660}" type="datetimeFigureOut">
               <a:rPr lang="en-US" smtClean="0"/>
-              <a:t>11/30/2014</a:t>
+              <a:t>12/1/2014</a:t>
             </a:fld>
             <a:endParaRPr lang="en-US"/>
           </a:p>
@@ -3899,7 +3915,7 @@
           <a:p>
             <a:fld id="{8E57C33F-FC88-4120-B878-9148FF06A660}" type="datetimeFigureOut">
               <a:rPr lang="en-US" smtClean="0"/>
-              <a:t>11/30/2014</a:t>
+              <a:t>12/1/2014</a:t>
             </a:fld>
             <a:endParaRPr lang="en-US"/>
           </a:p>
@@ -4166,7 +4182,7 @@
           <a:p>
             <a:fld id="{8E57C33F-FC88-4120-B878-9148FF06A660}" type="datetimeFigureOut">
               <a:rPr lang="en-US" smtClean="0"/>
-              <a:t>11/30/2014</a:t>
+              <a:t>12/1/2014</a:t>
             </a:fld>
             <a:endParaRPr lang="en-US"/>
           </a:p>
@@ -4581,7 +4597,7 @@
           <a:p>
             <a:fld id="{8E57C33F-FC88-4120-B878-9148FF06A660}" type="datetimeFigureOut">
               <a:rPr lang="en-US" smtClean="0"/>
-              <a:t>11/30/2014</a:t>
+              <a:t>12/1/2014</a:t>
             </a:fld>
             <a:endParaRPr lang="en-US"/>
           </a:p>
@@ -4729,7 +4745,7 @@
           <a:p>
             <a:fld id="{8E57C33F-FC88-4120-B878-9148FF06A660}" type="datetimeFigureOut">
               <a:rPr lang="en-US" smtClean="0"/>
-              <a:t>11/30/2014</a:t>
+              <a:t>12/1/2014</a:t>
             </a:fld>
             <a:endParaRPr lang="en-US"/>
           </a:p>
@@ -4854,7 +4870,7 @@
           <a:p>
             <a:fld id="{8E57C33F-FC88-4120-B878-9148FF06A660}" type="datetimeFigureOut">
               <a:rPr lang="en-US" smtClean="0"/>
-              <a:t>11/30/2014</a:t>
+              <a:t>12/1/2014</a:t>
             </a:fld>
             <a:endParaRPr lang="en-US"/>
           </a:p>
@@ -5133,7 +5149,7 @@
           <a:p>
             <a:fld id="{8E57C33F-FC88-4120-B878-9148FF06A660}" type="datetimeFigureOut">
               <a:rPr lang="en-US" smtClean="0"/>
-              <a:t>11/30/2014</a:t>
+              <a:t>12/1/2014</a:t>
             </a:fld>
             <a:endParaRPr lang="en-US"/>
           </a:p>
@@ -5445,7 +5461,7 @@
           <a:p>
             <a:fld id="{8E57C33F-FC88-4120-B878-9148FF06A660}" type="datetimeFigureOut">
               <a:rPr lang="en-US" smtClean="0"/>
-              <a:t>11/30/2014</a:t>
+              <a:t>12/1/2014</a:t>
             </a:fld>
             <a:endParaRPr lang="en-US"/>
           </a:p>
@@ -5698,7 +5714,7 @@
           <a:p>
             <a:fld id="{8E57C33F-FC88-4120-B878-9148FF06A660}" type="datetimeFigureOut">
               <a:rPr lang="en-US" smtClean="0"/>
-              <a:t>11/30/2014</a:t>
+              <a:t>12/1/2014</a:t>
             </a:fld>
             <a:endParaRPr lang="en-US"/>
           </a:p>
@@ -6226,6 +6242,1094 @@
 </p:sld>
 </file>
 
+<file path=ppt/slides/slide10.xml><?xml version="1.0" encoding="utf-8"?>
+<p:sld xmlns:a="http://schemas.openxmlformats.org/drawingml/2006/main" xmlns:r="http://schemas.openxmlformats.org/officeDocument/2006/relationships" xmlns:p="http://schemas.openxmlformats.org/presentationml/2006/main">
+  <p:cSld>
+    <p:spTree>
+      <p:nvGrpSpPr>
+        <p:cNvPr id="1" name=""/>
+        <p:cNvGrpSpPr/>
+        <p:nvPr/>
+      </p:nvGrpSpPr>
+      <p:grpSpPr>
+        <a:xfrm>
+          <a:off x="0" y="0"/>
+          <a:ext cx="0" cy="0"/>
+          <a:chOff x="0" y="0"/>
+          <a:chExt cx="0" cy="0"/>
+        </a:xfrm>
+      </p:grpSpPr>
+      <p:sp>
+        <p:nvSpPr>
+          <p:cNvPr id="2" name="Title 1"/>
+          <p:cNvSpPr>
+            <a:spLocks noGrp="1"/>
+          </p:cNvSpPr>
+          <p:nvPr>
+            <p:ph type="title"/>
+          </p:nvPr>
+        </p:nvSpPr>
+        <p:spPr/>
+        <p:txBody>
+          <a:bodyPr/>
+          <a:lstStyle/>
+          <a:p>
+            <a:r>
+              <a:rPr lang="bg-BG" dirty="0" smtClean="0"/>
+              <a:t>задача</a:t>
+            </a:r>
+            <a:endParaRPr lang="en-US" dirty="0"/>
+          </a:p>
+        </p:txBody>
+      </p:sp>
+      <p:sp>
+        <p:nvSpPr>
+          <p:cNvPr id="3" name="Content Placeholder 2"/>
+          <p:cNvSpPr>
+            <a:spLocks noGrp="1"/>
+          </p:cNvSpPr>
+          <p:nvPr>
+            <p:ph sz="quarter" idx="13"/>
+          </p:nvPr>
+        </p:nvSpPr>
+        <p:spPr/>
+        <p:txBody>
+          <a:bodyPr/>
+          <a:lstStyle/>
+          <a:p>
+            <a:r>
+              <a:rPr lang="bg-BG" dirty="0" smtClean="0"/>
+              <a:t>С помощта на функции в </a:t>
+            </a:r>
+            <a:r>
+              <a:rPr lang="en-US" dirty="0" err="1" smtClean="0"/>
+              <a:t>php</a:t>
+            </a:r>
+            <a:r>
+              <a:rPr lang="en-US" dirty="0" smtClean="0"/>
+              <a:t> </a:t>
+            </a:r>
+            <a:r>
+              <a:rPr lang="bg-BG" dirty="0" smtClean="0"/>
+              <a:t>направете програма, която пресмята лицето на триъгълник по зададена страна и височина към нея. (</a:t>
+            </a:r>
+            <a:r>
+              <a:rPr lang="en-US" dirty="0" smtClean="0"/>
+              <a:t>S=</a:t>
+            </a:r>
+            <a:r>
+              <a:rPr lang="en-US" dirty="0" err="1" smtClean="0"/>
+              <a:t>a.ha</a:t>
+            </a:r>
+            <a:r>
+              <a:rPr lang="en-US" dirty="0" smtClean="0"/>
+              <a:t>/2</a:t>
+            </a:r>
+            <a:r>
+              <a:rPr lang="bg-BG" dirty="0" smtClean="0"/>
+              <a:t>)</a:t>
+            </a:r>
+            <a:r>
+              <a:rPr lang="en-US" dirty="0" smtClean="0"/>
+              <a:t>. </a:t>
+            </a:r>
+            <a:r>
+              <a:rPr lang="bg-BG" dirty="0" smtClean="0"/>
+              <a:t>На случаен принцип генерирайте 10 различни страни и съответно височини към тях и изведете лицето на образувания от тях триъгълник на екрана</a:t>
+            </a:r>
+          </a:p>
+          <a:p>
+            <a:pPr marL="0" indent="0">
+              <a:buNone/>
+            </a:pPr>
+            <a:r>
+              <a:rPr lang="bg-BG" dirty="0" smtClean="0"/>
+              <a:t>Ако лицето е до 10 см2 – оцветете текста в зелен цвят</a:t>
+            </a:r>
+          </a:p>
+          <a:p>
+            <a:pPr marL="0" indent="0">
+              <a:buNone/>
+            </a:pPr>
+            <a:r>
+              <a:rPr lang="bg-BG" dirty="0" err="1" smtClean="0"/>
+              <a:t>АКо</a:t>
+            </a:r>
+            <a:r>
+              <a:rPr lang="bg-BG" dirty="0" smtClean="0"/>
+              <a:t> лицето е от 10 до 23 см2 – оцветете текста в червен цвят</a:t>
+            </a:r>
+          </a:p>
+          <a:p>
+            <a:pPr marL="0" indent="0">
+              <a:buNone/>
+            </a:pPr>
+            <a:r>
+              <a:rPr lang="bg-BG" dirty="0" smtClean="0"/>
+              <a:t>Ако лицето е по-голямо от 23 см2 – </a:t>
+            </a:r>
+            <a:r>
+              <a:rPr lang="bg-BG" dirty="0" err="1" smtClean="0"/>
+              <a:t>оцветте</a:t>
+            </a:r>
+            <a:r>
+              <a:rPr lang="bg-BG" dirty="0" smtClean="0"/>
+              <a:t> текста в син цвят</a:t>
+            </a:r>
+            <a:endParaRPr lang="en-US" dirty="0"/>
+          </a:p>
+        </p:txBody>
+      </p:sp>
+    </p:spTree>
+    <p:extLst>
+      <p:ext uri="{BB962C8B-B14F-4D97-AF65-F5344CB8AC3E}">
+        <p14:creationId xmlns:p14="http://schemas.microsoft.com/office/powerpoint/2010/main" val="2021918048"/>
+      </p:ext>
+    </p:extLst>
+  </p:cSld>
+  <p:clrMapOvr>
+    <a:masterClrMapping/>
+  </p:clrMapOvr>
+</p:sld>
+</file>
+
+<file path=ppt/slides/slide11.xml><?xml version="1.0" encoding="utf-8"?>
+<p:sld xmlns:a="http://schemas.openxmlformats.org/drawingml/2006/main" xmlns:r="http://schemas.openxmlformats.org/officeDocument/2006/relationships" xmlns:p="http://schemas.openxmlformats.org/presentationml/2006/main">
+  <p:cSld>
+    <p:spTree>
+      <p:nvGrpSpPr>
+        <p:cNvPr id="1" name=""/>
+        <p:cNvGrpSpPr/>
+        <p:nvPr/>
+      </p:nvGrpSpPr>
+      <p:grpSpPr>
+        <a:xfrm>
+          <a:off x="0" y="0"/>
+          <a:ext cx="0" cy="0"/>
+          <a:chOff x="0" y="0"/>
+          <a:chExt cx="0" cy="0"/>
+        </a:xfrm>
+      </p:grpSpPr>
+      <p:sp>
+        <p:nvSpPr>
+          <p:cNvPr id="2" name="Title 1"/>
+          <p:cNvSpPr>
+            <a:spLocks noGrp="1"/>
+          </p:cNvSpPr>
+          <p:nvPr>
+            <p:ph type="title"/>
+          </p:nvPr>
+        </p:nvSpPr>
+        <p:spPr/>
+        <p:txBody>
+          <a:bodyPr/>
+          <a:lstStyle/>
+          <a:p>
+            <a:r>
+              <a:rPr lang="bg-BG" dirty="0" smtClean="0"/>
+              <a:t>Параметри на функции със стойност по подразбиране</a:t>
+            </a:r>
+            <a:endParaRPr lang="en-US" dirty="0"/>
+          </a:p>
+        </p:txBody>
+      </p:sp>
+      <p:sp>
+        <p:nvSpPr>
+          <p:cNvPr id="3" name="Content Placeholder 2"/>
+          <p:cNvSpPr>
+            <a:spLocks noGrp="1"/>
+          </p:cNvSpPr>
+          <p:nvPr>
+            <p:ph sz="quarter" idx="13"/>
+          </p:nvPr>
+        </p:nvSpPr>
+        <p:spPr/>
+        <p:txBody>
+          <a:bodyPr/>
+          <a:lstStyle/>
+          <a:p>
+            <a:r>
+              <a:rPr lang="bg-BG" dirty="0" smtClean="0"/>
+              <a:t>Параметрите на функциите в </a:t>
+            </a:r>
+            <a:r>
+              <a:rPr lang="en-US" dirty="0" err="1" smtClean="0"/>
+              <a:t>Php</a:t>
+            </a:r>
+            <a:r>
+              <a:rPr lang="en-US" dirty="0" smtClean="0"/>
+              <a:t> </a:t>
+            </a:r>
+            <a:r>
+              <a:rPr lang="bg-BG" dirty="0" smtClean="0"/>
+              <a:t>могат да има стойност по подразбиране (</a:t>
+            </a:r>
+            <a:r>
+              <a:rPr lang="en-US" dirty="0" smtClean="0"/>
+              <a:t>default value</a:t>
+            </a:r>
+            <a:r>
+              <a:rPr lang="bg-BG" dirty="0" smtClean="0"/>
+              <a:t>)</a:t>
+            </a:r>
+            <a:endParaRPr lang="en-US" dirty="0" smtClean="0"/>
+          </a:p>
+          <a:p>
+            <a:r>
+              <a:rPr lang="bg-BG" dirty="0" smtClean="0"/>
+              <a:t>Параметрите със стойност по подразбиране винаги трябва да бъдат на последно място</a:t>
+            </a:r>
+            <a:endParaRPr lang="en-US" dirty="0" smtClean="0"/>
+          </a:p>
+          <a:p>
+            <a:endParaRPr lang="en-US" dirty="0"/>
+          </a:p>
+        </p:txBody>
+      </p:sp>
+    </p:spTree>
+    <p:extLst>
+      <p:ext uri="{BB962C8B-B14F-4D97-AF65-F5344CB8AC3E}">
+        <p14:creationId xmlns:p14="http://schemas.microsoft.com/office/powerpoint/2010/main" val="805068859"/>
+      </p:ext>
+    </p:extLst>
+  </p:cSld>
+  <p:clrMapOvr>
+    <a:masterClrMapping/>
+  </p:clrMapOvr>
+</p:sld>
+</file>
+
+<file path=ppt/slides/slide12.xml><?xml version="1.0" encoding="utf-8"?>
+<p:sld xmlns:a="http://schemas.openxmlformats.org/drawingml/2006/main" xmlns:r="http://schemas.openxmlformats.org/officeDocument/2006/relationships" xmlns:p="http://schemas.openxmlformats.org/presentationml/2006/main">
+  <p:cSld>
+    <p:spTree>
+      <p:nvGrpSpPr>
+        <p:cNvPr id="1" name=""/>
+        <p:cNvGrpSpPr/>
+        <p:nvPr/>
+      </p:nvGrpSpPr>
+      <p:grpSpPr>
+        <a:xfrm>
+          <a:off x="0" y="0"/>
+          <a:ext cx="0" cy="0"/>
+          <a:chOff x="0" y="0"/>
+          <a:chExt cx="0" cy="0"/>
+        </a:xfrm>
+      </p:grpSpPr>
+      <p:sp>
+        <p:nvSpPr>
+          <p:cNvPr id="2" name="Title 1"/>
+          <p:cNvSpPr>
+            <a:spLocks noGrp="1"/>
+          </p:cNvSpPr>
+          <p:nvPr>
+            <p:ph type="title"/>
+          </p:nvPr>
+        </p:nvSpPr>
+        <p:spPr/>
+        <p:txBody>
+          <a:bodyPr/>
+          <a:lstStyle/>
+          <a:p>
+            <a:r>
+              <a:rPr lang="bg-BG" dirty="0"/>
+              <a:t>Параметри на функции със стойност по </a:t>
+            </a:r>
+            <a:r>
+              <a:rPr lang="bg-BG" dirty="0" smtClean="0"/>
+              <a:t>подразбиране</a:t>
+            </a:r>
+            <a:r>
+              <a:rPr lang="en-US" dirty="0" smtClean="0"/>
+              <a:t> </a:t>
+            </a:r>
+            <a:r>
+              <a:rPr lang="bg-BG" dirty="0" smtClean="0"/>
+              <a:t>демо</a:t>
+            </a:r>
+            <a:endParaRPr lang="en-US" dirty="0"/>
+          </a:p>
+        </p:txBody>
+      </p:sp>
+      <p:pic>
+        <p:nvPicPr>
+          <p:cNvPr id="3074" name="Picture 2" descr="http://www.mining.com/wp-content/uploads/2012/05/default-300x250.jpg"/>
+          <p:cNvPicPr>
+            <a:picLocks noChangeAspect="1" noChangeArrowheads="1"/>
+          </p:cNvPicPr>
+          <p:nvPr/>
+        </p:nvPicPr>
+        <p:blipFill>
+          <a:blip r:embed="rId2">
+            <a:extLst>
+              <a:ext uri="{28A0092B-C50C-407E-A947-70E740481C1C}">
+                <a14:useLocalDpi xmlns:a14="http://schemas.microsoft.com/office/drawing/2010/main" val="0"/>
+              </a:ext>
+            </a:extLst>
+          </a:blip>
+          <a:srcRect/>
+          <a:stretch>
+            <a:fillRect/>
+          </a:stretch>
+        </p:blipFill>
+        <p:spPr bwMode="auto">
+          <a:xfrm>
+            <a:off x="3609113" y="2214694"/>
+            <a:ext cx="4973774" cy="4144812"/>
+          </a:xfrm>
+          <a:prstGeom prst="rect">
+            <a:avLst/>
+          </a:prstGeom>
+          <a:noFill/>
+          <a:extLst>
+            <a:ext uri="{909E8E84-426E-40DD-AFC4-6F175D3DCCD1}">
+              <a14:hiddenFill xmlns:a14="http://schemas.microsoft.com/office/drawing/2010/main">
+                <a:solidFill>
+                  <a:srgbClr val="FFFFFF"/>
+                </a:solidFill>
+              </a14:hiddenFill>
+            </a:ext>
+          </a:extLst>
+        </p:spPr>
+      </p:pic>
+    </p:spTree>
+    <p:extLst>
+      <p:ext uri="{BB962C8B-B14F-4D97-AF65-F5344CB8AC3E}">
+        <p14:creationId xmlns:p14="http://schemas.microsoft.com/office/powerpoint/2010/main" val="4016942806"/>
+      </p:ext>
+    </p:extLst>
+  </p:cSld>
+  <p:clrMapOvr>
+    <a:masterClrMapping/>
+  </p:clrMapOvr>
+</p:sld>
+</file>
+
+<file path=ppt/slides/slide13.xml><?xml version="1.0" encoding="utf-8"?>
+<p:sld xmlns:a="http://schemas.openxmlformats.org/drawingml/2006/main" xmlns:r="http://schemas.openxmlformats.org/officeDocument/2006/relationships" xmlns:p="http://schemas.openxmlformats.org/presentationml/2006/main">
+  <p:cSld>
+    <p:spTree>
+      <p:nvGrpSpPr>
+        <p:cNvPr id="1" name=""/>
+        <p:cNvGrpSpPr/>
+        <p:nvPr/>
+      </p:nvGrpSpPr>
+      <p:grpSpPr>
+        <a:xfrm>
+          <a:off x="0" y="0"/>
+          <a:ext cx="0" cy="0"/>
+          <a:chOff x="0" y="0"/>
+          <a:chExt cx="0" cy="0"/>
+        </a:xfrm>
+      </p:grpSpPr>
+      <p:sp>
+        <p:nvSpPr>
+          <p:cNvPr id="2" name="Title 1"/>
+          <p:cNvSpPr>
+            <a:spLocks noGrp="1"/>
+          </p:cNvSpPr>
+          <p:nvPr>
+            <p:ph type="title"/>
+          </p:nvPr>
+        </p:nvSpPr>
+        <p:spPr/>
+        <p:txBody>
+          <a:bodyPr/>
+          <a:lstStyle/>
+          <a:p>
+            <a:r>
+              <a:rPr lang="bg-BG" dirty="0" smtClean="0"/>
+              <a:t>Предаване на параметър по референция</a:t>
+            </a:r>
+            <a:endParaRPr lang="en-US" dirty="0"/>
+          </a:p>
+        </p:txBody>
+      </p:sp>
+      <p:sp>
+        <p:nvSpPr>
+          <p:cNvPr id="3" name="Content Placeholder 2"/>
+          <p:cNvSpPr>
+            <a:spLocks noGrp="1"/>
+          </p:cNvSpPr>
+          <p:nvPr>
+            <p:ph sz="quarter" idx="13"/>
+          </p:nvPr>
+        </p:nvSpPr>
+        <p:spPr/>
+        <p:txBody>
+          <a:bodyPr/>
+          <a:lstStyle/>
+          <a:p>
+            <a:r>
+              <a:rPr lang="bg-BG" dirty="0" smtClean="0"/>
+              <a:t>Подаването по референция става с префикс </a:t>
+            </a:r>
+            <a:r>
+              <a:rPr lang="en-US" dirty="0" smtClean="0"/>
+              <a:t>$</a:t>
+            </a:r>
+          </a:p>
+          <a:p>
+            <a:r>
+              <a:rPr lang="bg-BG" dirty="0" smtClean="0"/>
+              <a:t>При предаване на параметър по референция, съответния параметър може да бъде променен вътре във функцията</a:t>
+            </a:r>
+            <a:endParaRPr lang="en-US" dirty="0" smtClean="0"/>
+          </a:p>
+          <a:p>
+            <a:r>
+              <a:rPr lang="bg-BG" dirty="0" smtClean="0"/>
+              <a:t>При предаване на параметър по референция се предава неговият адрес в паметта</a:t>
+            </a:r>
+          </a:p>
+        </p:txBody>
+      </p:sp>
+    </p:spTree>
+    <p:extLst>
+      <p:ext uri="{BB962C8B-B14F-4D97-AF65-F5344CB8AC3E}">
+        <p14:creationId xmlns:p14="http://schemas.microsoft.com/office/powerpoint/2010/main" val="1599633240"/>
+      </p:ext>
+    </p:extLst>
+  </p:cSld>
+  <p:clrMapOvr>
+    <a:masterClrMapping/>
+  </p:clrMapOvr>
+</p:sld>
+</file>
+
+<file path=ppt/slides/slide14.xml><?xml version="1.0" encoding="utf-8"?>
+<p:sld xmlns:a="http://schemas.openxmlformats.org/drawingml/2006/main" xmlns:r="http://schemas.openxmlformats.org/officeDocument/2006/relationships" xmlns:p="http://schemas.openxmlformats.org/presentationml/2006/main">
+  <p:cSld>
+    <p:spTree>
+      <p:nvGrpSpPr>
+        <p:cNvPr id="1" name=""/>
+        <p:cNvGrpSpPr/>
+        <p:nvPr/>
+      </p:nvGrpSpPr>
+      <p:grpSpPr>
+        <a:xfrm>
+          <a:off x="0" y="0"/>
+          <a:ext cx="0" cy="0"/>
+          <a:chOff x="0" y="0"/>
+          <a:chExt cx="0" cy="0"/>
+        </a:xfrm>
+      </p:grpSpPr>
+      <p:sp>
+        <p:nvSpPr>
+          <p:cNvPr id="2" name="Title 1"/>
+          <p:cNvSpPr>
+            <a:spLocks noGrp="1"/>
+          </p:cNvSpPr>
+          <p:nvPr>
+            <p:ph type="title"/>
+          </p:nvPr>
+        </p:nvSpPr>
+        <p:spPr/>
+        <p:txBody>
+          <a:bodyPr/>
+          <a:lstStyle/>
+          <a:p>
+            <a:r>
+              <a:rPr lang="bg-BG" dirty="0"/>
+              <a:t>Предаване на параметър по </a:t>
+            </a:r>
+            <a:r>
+              <a:rPr lang="bg-BG" dirty="0" smtClean="0"/>
+              <a:t>референция</a:t>
+            </a:r>
+            <a:r>
+              <a:rPr lang="en-US" dirty="0" smtClean="0"/>
+              <a:t> </a:t>
+            </a:r>
+            <a:r>
+              <a:rPr lang="bg-BG" dirty="0" smtClean="0"/>
+              <a:t>демо</a:t>
+            </a:r>
+            <a:endParaRPr lang="en-US" dirty="0"/>
+          </a:p>
+        </p:txBody>
+      </p:sp>
+      <p:pic>
+        <p:nvPicPr>
+          <p:cNvPr id="4098" name="Picture 2" descr="http://www.ccwd-staff.com/Safety/Reference.gif"/>
+          <p:cNvPicPr>
+            <a:picLocks noChangeAspect="1" noChangeArrowheads="1"/>
+          </p:cNvPicPr>
+          <p:nvPr/>
+        </p:nvPicPr>
+        <p:blipFill>
+          <a:blip r:embed="rId2">
+            <a:extLst>
+              <a:ext uri="{28A0092B-C50C-407E-A947-70E740481C1C}">
+                <a14:useLocalDpi xmlns:a14="http://schemas.microsoft.com/office/drawing/2010/main" val="0"/>
+              </a:ext>
+            </a:extLst>
+          </a:blip>
+          <a:srcRect/>
+          <a:stretch>
+            <a:fillRect/>
+          </a:stretch>
+        </p:blipFill>
+        <p:spPr bwMode="auto">
+          <a:xfrm>
+            <a:off x="3844245" y="2214694"/>
+            <a:ext cx="4503510" cy="4490679"/>
+          </a:xfrm>
+          <a:prstGeom prst="rect">
+            <a:avLst/>
+          </a:prstGeom>
+          <a:noFill/>
+          <a:extLst>
+            <a:ext uri="{909E8E84-426E-40DD-AFC4-6F175D3DCCD1}">
+              <a14:hiddenFill xmlns:a14="http://schemas.microsoft.com/office/drawing/2010/main">
+                <a:solidFill>
+                  <a:srgbClr val="FFFFFF"/>
+                </a:solidFill>
+              </a14:hiddenFill>
+            </a:ext>
+          </a:extLst>
+        </p:spPr>
+      </p:pic>
+    </p:spTree>
+    <p:extLst>
+      <p:ext uri="{BB962C8B-B14F-4D97-AF65-F5344CB8AC3E}">
+        <p14:creationId xmlns:p14="http://schemas.microsoft.com/office/powerpoint/2010/main" val="3821810926"/>
+      </p:ext>
+    </p:extLst>
+  </p:cSld>
+  <p:clrMapOvr>
+    <a:masterClrMapping/>
+  </p:clrMapOvr>
+</p:sld>
+</file>
+
+<file path=ppt/slides/slide15.xml><?xml version="1.0" encoding="utf-8"?>
+<p:sld xmlns:a="http://schemas.openxmlformats.org/drawingml/2006/main" xmlns:r="http://schemas.openxmlformats.org/officeDocument/2006/relationships" xmlns:p="http://schemas.openxmlformats.org/presentationml/2006/main">
+  <p:cSld>
+    <p:spTree>
+      <p:nvGrpSpPr>
+        <p:cNvPr id="1" name=""/>
+        <p:cNvGrpSpPr/>
+        <p:nvPr/>
+      </p:nvGrpSpPr>
+      <p:grpSpPr>
+        <a:xfrm>
+          <a:off x="0" y="0"/>
+          <a:ext cx="0" cy="0"/>
+          <a:chOff x="0" y="0"/>
+          <a:chExt cx="0" cy="0"/>
+        </a:xfrm>
+      </p:grpSpPr>
+      <p:sp>
+        <p:nvSpPr>
+          <p:cNvPr id="2" name="Title 1"/>
+          <p:cNvSpPr>
+            <a:spLocks noGrp="1"/>
+          </p:cNvSpPr>
+          <p:nvPr>
+            <p:ph type="title"/>
+          </p:nvPr>
+        </p:nvSpPr>
+        <p:spPr/>
+        <p:txBody>
+          <a:bodyPr/>
+          <a:lstStyle/>
+          <a:p>
+            <a:r>
+              <a:rPr lang="bg-BG" dirty="0" smtClean="0"/>
+              <a:t>Вариращ брой на параметри в </a:t>
+            </a:r>
+            <a:r>
+              <a:rPr lang="en-US" dirty="0" smtClean="0"/>
+              <a:t>PHP</a:t>
+            </a:r>
+            <a:endParaRPr lang="en-US" dirty="0"/>
+          </a:p>
+        </p:txBody>
+      </p:sp>
+      <p:sp>
+        <p:nvSpPr>
+          <p:cNvPr id="3" name="Content Placeholder 2"/>
+          <p:cNvSpPr>
+            <a:spLocks noGrp="1"/>
+          </p:cNvSpPr>
+          <p:nvPr>
+            <p:ph sz="quarter" idx="13"/>
+          </p:nvPr>
+        </p:nvSpPr>
+        <p:spPr/>
+        <p:txBody>
+          <a:bodyPr/>
+          <a:lstStyle/>
+          <a:p>
+            <a:r>
+              <a:rPr lang="bg-BG" dirty="0" smtClean="0"/>
+              <a:t>Броят на параметрите на една функция може да варира</a:t>
+            </a:r>
+          </a:p>
+          <a:p>
+            <a:r>
+              <a:rPr lang="bg-BG" dirty="0" smtClean="0"/>
+              <a:t>Този подход се използва когато параметрите са един и същ тип</a:t>
+            </a:r>
+          </a:p>
+          <a:p>
+            <a:r>
+              <a:rPr lang="bg-BG" dirty="0" smtClean="0"/>
+              <a:t>Параметрите на функцията могат да представят като масив с помощта на </a:t>
+            </a:r>
+            <a:r>
+              <a:rPr lang="bg-BG" dirty="0" err="1" smtClean="0"/>
+              <a:t>фун</a:t>
+            </a:r>
+            <a:r>
+              <a:rPr lang="en-US" dirty="0" smtClean="0"/>
+              <a:t>k</a:t>
+            </a:r>
+            <a:r>
+              <a:rPr lang="bg-BG" dirty="0" err="1" smtClean="0"/>
+              <a:t>цията</a:t>
+            </a:r>
+            <a:r>
+              <a:rPr lang="bg-BG" dirty="0" smtClean="0"/>
+              <a:t> </a:t>
+            </a:r>
+            <a:r>
+              <a:rPr lang="pt-BR" noProof="1"/>
+              <a:t>func_get_args() </a:t>
+            </a:r>
+            <a:endParaRPr lang="en-US" dirty="0"/>
+          </a:p>
+        </p:txBody>
+      </p:sp>
+    </p:spTree>
+    <p:extLst>
+      <p:ext uri="{BB962C8B-B14F-4D97-AF65-F5344CB8AC3E}">
+        <p14:creationId xmlns:p14="http://schemas.microsoft.com/office/powerpoint/2010/main" val="1281831436"/>
+      </p:ext>
+    </p:extLst>
+  </p:cSld>
+  <p:clrMapOvr>
+    <a:masterClrMapping/>
+  </p:clrMapOvr>
+</p:sld>
+</file>
+
+<file path=ppt/slides/slide16.xml><?xml version="1.0" encoding="utf-8"?>
+<p:sld xmlns:a="http://schemas.openxmlformats.org/drawingml/2006/main" xmlns:r="http://schemas.openxmlformats.org/officeDocument/2006/relationships" xmlns:p="http://schemas.openxmlformats.org/presentationml/2006/main">
+  <p:cSld>
+    <p:spTree>
+      <p:nvGrpSpPr>
+        <p:cNvPr id="1" name=""/>
+        <p:cNvGrpSpPr/>
+        <p:nvPr/>
+      </p:nvGrpSpPr>
+      <p:grpSpPr>
+        <a:xfrm>
+          <a:off x="0" y="0"/>
+          <a:ext cx="0" cy="0"/>
+          <a:chOff x="0" y="0"/>
+          <a:chExt cx="0" cy="0"/>
+        </a:xfrm>
+      </p:grpSpPr>
+      <p:sp>
+        <p:nvSpPr>
+          <p:cNvPr id="2" name="Title 1"/>
+          <p:cNvSpPr>
+            <a:spLocks noGrp="1"/>
+          </p:cNvSpPr>
+          <p:nvPr>
+            <p:ph type="title"/>
+          </p:nvPr>
+        </p:nvSpPr>
+        <p:spPr/>
+        <p:txBody>
+          <a:bodyPr/>
+          <a:lstStyle/>
+          <a:p>
+            <a:r>
+              <a:rPr lang="bg-BG" dirty="0"/>
+              <a:t>Вариращ брой на параметри в </a:t>
+            </a:r>
+            <a:r>
+              <a:rPr lang="en-US" dirty="0"/>
+              <a:t>PHP</a:t>
+            </a:r>
+          </a:p>
+        </p:txBody>
+      </p:sp>
+      <p:pic>
+        <p:nvPicPr>
+          <p:cNvPr id="5122" name="Picture 2" descr="https://www.wrike.com/blog_images/100832/1,2,3.jpg"/>
+          <p:cNvPicPr>
+            <a:picLocks noChangeAspect="1" noChangeArrowheads="1"/>
+          </p:cNvPicPr>
+          <p:nvPr/>
+        </p:nvPicPr>
+        <p:blipFill>
+          <a:blip r:embed="rId2">
+            <a:extLst>
+              <a:ext uri="{28A0092B-C50C-407E-A947-70E740481C1C}">
+                <a14:useLocalDpi xmlns:a14="http://schemas.microsoft.com/office/drawing/2010/main" val="0"/>
+              </a:ext>
+            </a:extLst>
+          </a:blip>
+          <a:srcRect/>
+          <a:stretch>
+            <a:fillRect/>
+          </a:stretch>
+        </p:blipFill>
+        <p:spPr bwMode="auto">
+          <a:xfrm>
+            <a:off x="3839890" y="2214694"/>
+            <a:ext cx="4512219" cy="3850428"/>
+          </a:xfrm>
+          <a:prstGeom prst="rect">
+            <a:avLst/>
+          </a:prstGeom>
+          <a:noFill/>
+          <a:extLst>
+            <a:ext uri="{909E8E84-426E-40DD-AFC4-6F175D3DCCD1}">
+              <a14:hiddenFill xmlns:a14="http://schemas.microsoft.com/office/drawing/2010/main">
+                <a:solidFill>
+                  <a:srgbClr val="FFFFFF"/>
+                </a:solidFill>
+              </a14:hiddenFill>
+            </a:ext>
+          </a:extLst>
+        </p:spPr>
+      </p:pic>
+    </p:spTree>
+    <p:extLst>
+      <p:ext uri="{BB962C8B-B14F-4D97-AF65-F5344CB8AC3E}">
+        <p14:creationId xmlns:p14="http://schemas.microsoft.com/office/powerpoint/2010/main" val="2578060879"/>
+      </p:ext>
+    </p:extLst>
+  </p:cSld>
+  <p:clrMapOvr>
+    <a:masterClrMapping/>
+  </p:clrMapOvr>
+</p:sld>
+</file>
+
+<file path=ppt/slides/slide17.xml><?xml version="1.0" encoding="utf-8"?>
+<p:sld xmlns:a="http://schemas.openxmlformats.org/drawingml/2006/main" xmlns:r="http://schemas.openxmlformats.org/officeDocument/2006/relationships" xmlns:p="http://schemas.openxmlformats.org/presentationml/2006/main">
+  <p:cSld>
+    <p:spTree>
+      <p:nvGrpSpPr>
+        <p:cNvPr id="1" name=""/>
+        <p:cNvGrpSpPr/>
+        <p:nvPr/>
+      </p:nvGrpSpPr>
+      <p:grpSpPr>
+        <a:xfrm>
+          <a:off x="0" y="0"/>
+          <a:ext cx="0" cy="0"/>
+          <a:chOff x="0" y="0"/>
+          <a:chExt cx="0" cy="0"/>
+        </a:xfrm>
+      </p:grpSpPr>
+      <p:sp>
+        <p:nvSpPr>
+          <p:cNvPr id="2" name="Title 1"/>
+          <p:cNvSpPr>
+            <a:spLocks noGrp="1"/>
+          </p:cNvSpPr>
+          <p:nvPr>
+            <p:ph type="title"/>
+          </p:nvPr>
+        </p:nvSpPr>
+        <p:spPr/>
+        <p:txBody>
+          <a:bodyPr/>
+          <a:lstStyle/>
+          <a:p>
+            <a:r>
+              <a:rPr lang="bg-BG" dirty="0" smtClean="0"/>
+              <a:t>Видимост на променливите в </a:t>
+            </a:r>
+            <a:r>
+              <a:rPr lang="en-US" dirty="0" err="1" smtClean="0"/>
+              <a:t>php</a:t>
+            </a:r>
+            <a:endParaRPr lang="en-US" dirty="0"/>
+          </a:p>
+        </p:txBody>
+      </p:sp>
+      <p:sp>
+        <p:nvSpPr>
+          <p:cNvPr id="3" name="Content Placeholder 2"/>
+          <p:cNvSpPr>
+            <a:spLocks noGrp="1"/>
+          </p:cNvSpPr>
+          <p:nvPr>
+            <p:ph sz="quarter" idx="13"/>
+          </p:nvPr>
+        </p:nvSpPr>
+        <p:spPr/>
+        <p:txBody>
+          <a:bodyPr/>
+          <a:lstStyle/>
+          <a:p>
+            <a:r>
+              <a:rPr lang="bg-BG" dirty="0" smtClean="0"/>
+              <a:t>Променливите извън функциите не се „виждат“ в самите функции</a:t>
+            </a:r>
+          </a:p>
+          <a:p>
+            <a:r>
+              <a:rPr lang="bg-BG" dirty="0" smtClean="0"/>
+              <a:t>Променливите във функциите не </a:t>
+            </a:r>
+            <a:r>
+              <a:rPr lang="bg-BG" dirty="0"/>
+              <a:t>с</a:t>
+            </a:r>
+            <a:r>
+              <a:rPr lang="bg-BG" dirty="0" smtClean="0"/>
+              <a:t>е „виждат“ извън тях</a:t>
+            </a:r>
+          </a:p>
+          <a:p>
+            <a:r>
+              <a:rPr lang="bg-BG" dirty="0" smtClean="0"/>
+              <a:t>Ако в една функция искаме да виждаме глобална променлива използваме ключовата дума </a:t>
+            </a:r>
+            <a:r>
+              <a:rPr lang="en-US" dirty="0" smtClean="0"/>
+              <a:t>global</a:t>
+            </a:r>
+            <a:r>
+              <a:rPr lang="bg-BG" dirty="0" smtClean="0"/>
+              <a:t> </a:t>
+            </a:r>
+            <a:endParaRPr lang="en-US" dirty="0"/>
+          </a:p>
+        </p:txBody>
+      </p:sp>
+    </p:spTree>
+    <p:extLst>
+      <p:ext uri="{BB962C8B-B14F-4D97-AF65-F5344CB8AC3E}">
+        <p14:creationId xmlns:p14="http://schemas.microsoft.com/office/powerpoint/2010/main" val="1877277589"/>
+      </p:ext>
+    </p:extLst>
+  </p:cSld>
+  <p:clrMapOvr>
+    <a:masterClrMapping/>
+  </p:clrMapOvr>
+</p:sld>
+</file>
+
+<file path=ppt/slides/slide18.xml><?xml version="1.0" encoding="utf-8"?>
+<p:sld xmlns:a="http://schemas.openxmlformats.org/drawingml/2006/main" xmlns:r="http://schemas.openxmlformats.org/officeDocument/2006/relationships" xmlns:p="http://schemas.openxmlformats.org/presentationml/2006/main">
+  <p:cSld>
+    <p:spTree>
+      <p:nvGrpSpPr>
+        <p:cNvPr id="1" name=""/>
+        <p:cNvGrpSpPr/>
+        <p:nvPr/>
+      </p:nvGrpSpPr>
+      <p:grpSpPr>
+        <a:xfrm>
+          <a:off x="0" y="0"/>
+          <a:ext cx="0" cy="0"/>
+          <a:chOff x="0" y="0"/>
+          <a:chExt cx="0" cy="0"/>
+        </a:xfrm>
+      </p:grpSpPr>
+      <p:sp>
+        <p:nvSpPr>
+          <p:cNvPr id="2" name="Title 1"/>
+          <p:cNvSpPr>
+            <a:spLocks noGrp="1"/>
+          </p:cNvSpPr>
+          <p:nvPr>
+            <p:ph type="title"/>
+          </p:nvPr>
+        </p:nvSpPr>
+        <p:spPr/>
+        <p:txBody>
+          <a:bodyPr/>
+          <a:lstStyle/>
+          <a:p>
+            <a:r>
+              <a:rPr lang="bg-BG" dirty="0"/>
+              <a:t>Видимост на променливите в </a:t>
+            </a:r>
+            <a:r>
+              <a:rPr lang="en-US" dirty="0" err="1" smtClean="0"/>
+              <a:t>php</a:t>
+            </a:r>
+            <a:r>
+              <a:rPr lang="en-US" dirty="0" smtClean="0"/>
+              <a:t> </a:t>
+            </a:r>
+            <a:r>
+              <a:rPr lang="bg-BG" dirty="0" smtClean="0"/>
+              <a:t>демо</a:t>
+            </a:r>
+            <a:endParaRPr lang="en-US" dirty="0"/>
+          </a:p>
+        </p:txBody>
+      </p:sp>
+      <p:pic>
+        <p:nvPicPr>
+          <p:cNvPr id="6146" name="Picture 2" descr="http://www.nrangestore.com/media/catalog/product/cache/1/image/9df78eab33525d08d6e5fb8d27136e95/b/e/bec_scope.jpg"/>
+          <p:cNvPicPr>
+            <a:picLocks noChangeAspect="1" noChangeArrowheads="1"/>
+          </p:cNvPicPr>
+          <p:nvPr/>
+        </p:nvPicPr>
+        <p:blipFill>
+          <a:blip r:embed="rId2">
+            <a:extLst>
+              <a:ext uri="{28A0092B-C50C-407E-A947-70E740481C1C}">
+                <a14:useLocalDpi xmlns:a14="http://schemas.microsoft.com/office/drawing/2010/main" val="0"/>
+              </a:ext>
+            </a:extLst>
+          </a:blip>
+          <a:srcRect/>
+          <a:stretch>
+            <a:fillRect/>
+          </a:stretch>
+        </p:blipFill>
+        <p:spPr bwMode="auto">
+          <a:xfrm>
+            <a:off x="2461947" y="2214694"/>
+            <a:ext cx="7268106" cy="3611340"/>
+          </a:xfrm>
+          <a:prstGeom prst="rect">
+            <a:avLst/>
+          </a:prstGeom>
+          <a:noFill/>
+          <a:extLst>
+            <a:ext uri="{909E8E84-426E-40DD-AFC4-6F175D3DCCD1}">
+              <a14:hiddenFill xmlns:a14="http://schemas.microsoft.com/office/drawing/2010/main">
+                <a:solidFill>
+                  <a:srgbClr val="FFFFFF"/>
+                </a:solidFill>
+              </a14:hiddenFill>
+            </a:ext>
+          </a:extLst>
+        </p:spPr>
+      </p:pic>
+    </p:spTree>
+    <p:extLst>
+      <p:ext uri="{BB962C8B-B14F-4D97-AF65-F5344CB8AC3E}">
+        <p14:creationId xmlns:p14="http://schemas.microsoft.com/office/powerpoint/2010/main" val="3028703962"/>
+      </p:ext>
+    </p:extLst>
+  </p:cSld>
+  <p:clrMapOvr>
+    <a:masterClrMapping/>
+  </p:clrMapOvr>
+</p:sld>
+</file>
+
+<file path=ppt/slides/slide19.xml><?xml version="1.0" encoding="utf-8"?>
+<p:sld xmlns:a="http://schemas.openxmlformats.org/drawingml/2006/main" xmlns:r="http://schemas.openxmlformats.org/officeDocument/2006/relationships" xmlns:p="http://schemas.openxmlformats.org/presentationml/2006/main">
+  <p:cSld>
+    <p:spTree>
+      <p:nvGrpSpPr>
+        <p:cNvPr id="1" name=""/>
+        <p:cNvGrpSpPr/>
+        <p:nvPr/>
+      </p:nvGrpSpPr>
+      <p:grpSpPr>
+        <a:xfrm>
+          <a:off x="0" y="0"/>
+          <a:ext cx="0" cy="0"/>
+          <a:chOff x="0" y="0"/>
+          <a:chExt cx="0" cy="0"/>
+        </a:xfrm>
+      </p:grpSpPr>
+      <p:sp>
+        <p:nvSpPr>
+          <p:cNvPr id="2" name="Title 1"/>
+          <p:cNvSpPr>
+            <a:spLocks noGrp="1"/>
+          </p:cNvSpPr>
+          <p:nvPr>
+            <p:ph type="title"/>
+          </p:nvPr>
+        </p:nvSpPr>
+        <p:spPr/>
+        <p:txBody>
+          <a:bodyPr/>
+          <a:lstStyle/>
+          <a:p>
+            <a:r>
+              <a:rPr lang="bg-BG" dirty="0" smtClean="0"/>
+              <a:t>Статични променливи</a:t>
+            </a:r>
+            <a:endParaRPr lang="en-US" dirty="0"/>
+          </a:p>
+        </p:txBody>
+      </p:sp>
+      <p:sp>
+        <p:nvSpPr>
+          <p:cNvPr id="3" name="Content Placeholder 2"/>
+          <p:cNvSpPr>
+            <a:spLocks noGrp="1"/>
+          </p:cNvSpPr>
+          <p:nvPr>
+            <p:ph sz="quarter" idx="13"/>
+          </p:nvPr>
+        </p:nvSpPr>
+        <p:spPr/>
+        <p:txBody>
+          <a:bodyPr/>
+          <a:lstStyle/>
+          <a:p>
+            <a:r>
+              <a:rPr lang="bg-BG" dirty="0" smtClean="0"/>
+              <a:t>Статичните променливи се декларират с ключовата дума </a:t>
+            </a:r>
+            <a:r>
+              <a:rPr lang="en-US" dirty="0" smtClean="0"/>
+              <a:t>static</a:t>
+            </a:r>
+          </a:p>
+          <a:p>
+            <a:r>
+              <a:rPr lang="bg-BG" dirty="0" smtClean="0"/>
+              <a:t>Статичните променливи в </a:t>
+            </a:r>
+            <a:r>
+              <a:rPr lang="en-US" dirty="0" err="1" smtClean="0"/>
+              <a:t>php</a:t>
+            </a:r>
+            <a:r>
+              <a:rPr lang="en-US" dirty="0" smtClean="0"/>
+              <a:t> </a:t>
+            </a:r>
+            <a:r>
+              <a:rPr lang="bg-BG" dirty="0" smtClean="0"/>
+              <a:t>се инициализират само веднъж</a:t>
+            </a:r>
+          </a:p>
+          <a:p>
+            <a:r>
+              <a:rPr lang="bg-BG" dirty="0" smtClean="0"/>
+              <a:t>Стойността на статичните променливи в функция се запазва във всяко следващо извикване</a:t>
+            </a:r>
+            <a:endParaRPr lang="en-US" dirty="0"/>
+          </a:p>
+        </p:txBody>
+      </p:sp>
+    </p:spTree>
+    <p:extLst>
+      <p:ext uri="{BB962C8B-B14F-4D97-AF65-F5344CB8AC3E}">
+        <p14:creationId xmlns:p14="http://schemas.microsoft.com/office/powerpoint/2010/main" val="2120821526"/>
+      </p:ext>
+    </p:extLst>
+  </p:cSld>
+  <p:clrMapOvr>
+    <a:masterClrMapping/>
+  </p:clrMapOvr>
+</p:sld>
+</file>
+
 <file path=ppt/slides/slide2.xml><?xml version="1.0" encoding="utf-8"?>
 <p:sld xmlns:a="http://schemas.openxmlformats.org/drawingml/2006/main" xmlns:r="http://schemas.openxmlformats.org/officeDocument/2006/relationships" xmlns:p="http://schemas.openxmlformats.org/presentationml/2006/main">
   <p:cSld>
@@ -6310,6 +7414,340 @@
     <p:extLst>
       <p:ext uri="{BB962C8B-B14F-4D97-AF65-F5344CB8AC3E}">
         <p14:creationId xmlns:p14="http://schemas.microsoft.com/office/powerpoint/2010/main" val="915662950"/>
+      </p:ext>
+    </p:extLst>
+  </p:cSld>
+  <p:clrMapOvr>
+    <a:masterClrMapping/>
+  </p:clrMapOvr>
+</p:sld>
+</file>
+
+<file path=ppt/slides/slide20.xml><?xml version="1.0" encoding="utf-8"?>
+<p:sld xmlns:a="http://schemas.openxmlformats.org/drawingml/2006/main" xmlns:r="http://schemas.openxmlformats.org/officeDocument/2006/relationships" xmlns:p="http://schemas.openxmlformats.org/presentationml/2006/main">
+  <p:cSld>
+    <p:spTree>
+      <p:nvGrpSpPr>
+        <p:cNvPr id="1" name=""/>
+        <p:cNvGrpSpPr/>
+        <p:nvPr/>
+      </p:nvGrpSpPr>
+      <p:grpSpPr>
+        <a:xfrm>
+          <a:off x="0" y="0"/>
+          <a:ext cx="0" cy="0"/>
+          <a:chOff x="0" y="0"/>
+          <a:chExt cx="0" cy="0"/>
+        </a:xfrm>
+      </p:grpSpPr>
+      <p:sp>
+        <p:nvSpPr>
+          <p:cNvPr id="2" name="Title 1"/>
+          <p:cNvSpPr>
+            <a:spLocks noGrp="1"/>
+          </p:cNvSpPr>
+          <p:nvPr>
+            <p:ph type="title"/>
+          </p:nvPr>
+        </p:nvSpPr>
+        <p:spPr/>
+        <p:txBody>
+          <a:bodyPr/>
+          <a:lstStyle/>
+          <a:p>
+            <a:r>
+              <a:rPr lang="bg-BG" dirty="0"/>
+              <a:t>Статични </a:t>
+            </a:r>
+            <a:r>
+              <a:rPr lang="bg-BG" dirty="0" smtClean="0"/>
+              <a:t>променливи</a:t>
+            </a:r>
+            <a:r>
+              <a:rPr lang="en-US" dirty="0" smtClean="0"/>
+              <a:t> </a:t>
+            </a:r>
+            <a:r>
+              <a:rPr lang="bg-BG" dirty="0" smtClean="0"/>
+              <a:t>демо</a:t>
+            </a:r>
+            <a:endParaRPr lang="en-US" dirty="0"/>
+          </a:p>
+        </p:txBody>
+      </p:sp>
+      <p:pic>
+        <p:nvPicPr>
+          <p:cNvPr id="7170" name="Picture 2" descr="http://wnyu.org/static/images/static.jpg"/>
+          <p:cNvPicPr>
+            <a:picLocks noChangeAspect="1" noChangeArrowheads="1"/>
+          </p:cNvPicPr>
+          <p:nvPr/>
+        </p:nvPicPr>
+        <p:blipFill>
+          <a:blip r:embed="rId2">
+            <a:extLst>
+              <a:ext uri="{28A0092B-C50C-407E-A947-70E740481C1C}">
+                <a14:useLocalDpi xmlns:a14="http://schemas.microsoft.com/office/drawing/2010/main" val="0"/>
+              </a:ext>
+            </a:extLst>
+          </a:blip>
+          <a:srcRect/>
+          <a:stretch>
+            <a:fillRect/>
+          </a:stretch>
+        </p:blipFill>
+        <p:spPr bwMode="auto">
+          <a:xfrm>
+            <a:off x="2603273" y="2214694"/>
+            <a:ext cx="6985454" cy="3810248"/>
+          </a:xfrm>
+          <a:prstGeom prst="rect">
+            <a:avLst/>
+          </a:prstGeom>
+          <a:noFill/>
+          <a:extLst>
+            <a:ext uri="{909E8E84-426E-40DD-AFC4-6F175D3DCCD1}">
+              <a14:hiddenFill xmlns:a14="http://schemas.microsoft.com/office/drawing/2010/main">
+                <a:solidFill>
+                  <a:srgbClr val="FFFFFF"/>
+                </a:solidFill>
+              </a14:hiddenFill>
+            </a:ext>
+          </a:extLst>
+        </p:spPr>
+      </p:pic>
+    </p:spTree>
+    <p:extLst>
+      <p:ext uri="{BB962C8B-B14F-4D97-AF65-F5344CB8AC3E}">
+        <p14:creationId xmlns:p14="http://schemas.microsoft.com/office/powerpoint/2010/main" val="1529947685"/>
+      </p:ext>
+    </p:extLst>
+  </p:cSld>
+  <p:clrMapOvr>
+    <a:masterClrMapping/>
+  </p:clrMapOvr>
+</p:sld>
+</file>
+
+<file path=ppt/slides/slide21.xml><?xml version="1.0" encoding="utf-8"?>
+<p:sld xmlns:a="http://schemas.openxmlformats.org/drawingml/2006/main" xmlns:r="http://schemas.openxmlformats.org/officeDocument/2006/relationships" xmlns:p="http://schemas.openxmlformats.org/presentationml/2006/main">
+  <p:cSld>
+    <p:spTree>
+      <p:nvGrpSpPr>
+        <p:cNvPr id="1" name=""/>
+        <p:cNvGrpSpPr/>
+        <p:nvPr/>
+      </p:nvGrpSpPr>
+      <p:grpSpPr>
+        <a:xfrm>
+          <a:off x="0" y="0"/>
+          <a:ext cx="0" cy="0"/>
+          <a:chOff x="0" y="0"/>
+          <a:chExt cx="0" cy="0"/>
+        </a:xfrm>
+      </p:grpSpPr>
+      <p:sp>
+        <p:nvSpPr>
+          <p:cNvPr id="2" name="Title 1"/>
+          <p:cNvSpPr>
+            <a:spLocks noGrp="1"/>
+          </p:cNvSpPr>
+          <p:nvPr>
+            <p:ph type="title"/>
+          </p:nvPr>
+        </p:nvSpPr>
+        <p:spPr/>
+        <p:txBody>
+          <a:bodyPr/>
+          <a:lstStyle/>
+          <a:p>
+            <a:r>
+              <a:rPr lang="bg-BG" dirty="0" err="1" smtClean="0"/>
+              <a:t>ЗадачА</a:t>
+            </a:r>
+            <a:endParaRPr lang="en-US" dirty="0"/>
+          </a:p>
+        </p:txBody>
+      </p:sp>
+      <p:sp>
+        <p:nvSpPr>
+          <p:cNvPr id="3" name="Content Placeholder 2"/>
+          <p:cNvSpPr>
+            <a:spLocks noGrp="1"/>
+          </p:cNvSpPr>
+          <p:nvPr>
+            <p:ph sz="quarter" idx="13"/>
+          </p:nvPr>
+        </p:nvSpPr>
+        <p:spPr/>
+        <p:txBody>
+          <a:bodyPr/>
+          <a:lstStyle/>
+          <a:p>
+            <a:r>
+              <a:rPr lang="bg-BG" dirty="0" smtClean="0"/>
+              <a:t>НАПРАВЕТЕ ФУНКЦИЯТА КОЯТО ПРИЕМА 2 ПАРАМЕТЪРА: ЕДНО ЧИСЛО И ЕДНА ДУМА.</a:t>
+            </a:r>
+          </a:p>
+          <a:p>
+            <a:pPr marL="0" indent="0">
+              <a:buNone/>
+            </a:pPr>
+            <a:r>
+              <a:rPr lang="bg-BG" dirty="0" smtClean="0"/>
+              <a:t>Ако думата съдържа четен брой символи добавете към числото 12</a:t>
+            </a:r>
+          </a:p>
+          <a:p>
+            <a:pPr marL="0" indent="0">
+              <a:buNone/>
+            </a:pPr>
+            <a:r>
+              <a:rPr lang="bg-BG" dirty="0" smtClean="0"/>
+              <a:t>Ако думата съдържа нечетен брой символи извадете 3</a:t>
+            </a:r>
+          </a:p>
+          <a:p>
+            <a:pPr marL="0" indent="0">
+              <a:buNone/>
+            </a:pPr>
+            <a:r>
+              <a:rPr lang="bg-BG" dirty="0" smtClean="0"/>
+              <a:t>Ако след тази операция числото е по-голямо от 10 извадете от него 22</a:t>
+            </a:r>
+          </a:p>
+          <a:p>
+            <a:pPr marL="0" indent="0">
+              <a:buNone/>
+            </a:pPr>
+            <a:r>
+              <a:rPr lang="bg-BG" dirty="0" smtClean="0"/>
+              <a:t>Ако след операцията числото е отрицателно добавете 14.</a:t>
+            </a:r>
+          </a:p>
+          <a:p>
+            <a:pPr marL="0" indent="0">
+              <a:buNone/>
+            </a:pPr>
+            <a:r>
+              <a:rPr lang="bg-BG" dirty="0" smtClean="0"/>
+              <a:t>Стойността на числовият параметър трябва да се променя вътре в функцията</a:t>
+            </a:r>
+          </a:p>
+          <a:p>
+            <a:pPr marL="0" indent="0">
+              <a:buNone/>
+            </a:pPr>
+            <a:r>
+              <a:rPr lang="bg-BG" dirty="0" smtClean="0"/>
+              <a:t>Извикайте функцията 6 пъти с един и същи числов параметър и различни думи</a:t>
+            </a:r>
+          </a:p>
+        </p:txBody>
+      </p:sp>
+    </p:spTree>
+    <p:extLst>
+      <p:ext uri="{BB962C8B-B14F-4D97-AF65-F5344CB8AC3E}">
+        <p14:creationId xmlns:p14="http://schemas.microsoft.com/office/powerpoint/2010/main" val="3127698613"/>
+      </p:ext>
+    </p:extLst>
+  </p:cSld>
+  <p:clrMapOvr>
+    <a:masterClrMapping/>
+  </p:clrMapOvr>
+</p:sld>
+</file>
+
+<file path=ppt/slides/slide22.xml><?xml version="1.0" encoding="utf-8"?>
+<p:sld xmlns:a="http://schemas.openxmlformats.org/drawingml/2006/main" xmlns:r="http://schemas.openxmlformats.org/officeDocument/2006/relationships" xmlns:p="http://schemas.openxmlformats.org/presentationml/2006/main">
+  <p:cSld>
+    <p:spTree>
+      <p:nvGrpSpPr>
+        <p:cNvPr id="1" name=""/>
+        <p:cNvGrpSpPr/>
+        <p:nvPr/>
+      </p:nvGrpSpPr>
+      <p:grpSpPr>
+        <a:xfrm>
+          <a:off x="0" y="0"/>
+          <a:ext cx="0" cy="0"/>
+          <a:chOff x="0" y="0"/>
+          <a:chExt cx="0" cy="0"/>
+        </a:xfrm>
+      </p:grpSpPr>
+      <p:sp>
+        <p:nvSpPr>
+          <p:cNvPr id="2" name="Title 1"/>
+          <p:cNvSpPr>
+            <a:spLocks noGrp="1"/>
+          </p:cNvSpPr>
+          <p:nvPr>
+            <p:ph type="title"/>
+          </p:nvPr>
+        </p:nvSpPr>
+        <p:spPr>
+          <a:xfrm>
+            <a:off x="913775" y="618518"/>
+            <a:ext cx="10364451" cy="949026"/>
+          </a:xfrm>
+        </p:spPr>
+        <p:txBody>
+          <a:bodyPr/>
+          <a:lstStyle/>
+          <a:p>
+            <a:r>
+              <a:rPr lang="bg-BG" dirty="0" err="1" smtClean="0"/>
+              <a:t>вЪПРОСИ</a:t>
+            </a:r>
+            <a:endParaRPr lang="en-US" dirty="0"/>
+          </a:p>
+        </p:txBody>
+      </p:sp>
+      <p:pic>
+        <p:nvPicPr>
+          <p:cNvPr id="8196" name="Picture 4" descr="http://espei.com/wp-content/uploads/2013/05/equipmentprotection3.png"/>
+          <p:cNvPicPr>
+            <a:picLocks noChangeAspect="1" noChangeArrowheads="1"/>
+          </p:cNvPicPr>
+          <p:nvPr/>
+        </p:nvPicPr>
+        <p:blipFill>
+          <a:blip r:embed="rId2">
+            <a:extLst>
+              <a:ext uri="{28A0092B-C50C-407E-A947-70E740481C1C}">
+                <a14:useLocalDpi xmlns:a14="http://schemas.microsoft.com/office/drawing/2010/main" val="0"/>
+              </a:ext>
+            </a:extLst>
+          </a:blip>
+          <a:srcRect/>
+          <a:stretch>
+            <a:fillRect/>
+          </a:stretch>
+        </p:blipFill>
+        <p:spPr bwMode="auto">
+          <a:xfrm>
+            <a:off x="3669629" y="1663336"/>
+            <a:ext cx="4852742" cy="4852743"/>
+          </a:xfrm>
+          <a:prstGeom prst="rect">
+            <a:avLst/>
+          </a:prstGeom>
+          <a:noFill/>
+          <a:extLst>
+            <a:ext uri="{909E8E84-426E-40DD-AFC4-6F175D3DCCD1}">
+              <a14:hiddenFill xmlns:a14="http://schemas.microsoft.com/office/drawing/2010/main">
+                <a:solidFill>
+                  <a:srgbClr val="FFFFFF"/>
+                </a:solidFill>
+              </a14:hiddenFill>
+            </a:ext>
+          </a:extLst>
+        </p:spPr>
+      </p:pic>
+    </p:spTree>
+    <p:extLst>
+      <p:ext uri="{BB962C8B-B14F-4D97-AF65-F5344CB8AC3E}">
+        <p14:creationId xmlns:p14="http://schemas.microsoft.com/office/powerpoint/2010/main" val="2617988662"/>
       </p:ext>
     </p:extLst>
   </p:cSld>
@@ -6699,6 +8137,314 @@
     <p:extLst>
       <p:ext uri="{BB962C8B-B14F-4D97-AF65-F5344CB8AC3E}">
         <p14:creationId xmlns:p14="http://schemas.microsoft.com/office/powerpoint/2010/main" val="620052525"/>
+      </p:ext>
+    </p:extLst>
+  </p:cSld>
+  <p:clrMapOvr>
+    <a:masterClrMapping/>
+  </p:clrMapOvr>
+</p:sld>
+</file>
+
+<file path=ppt/slides/slide7.xml><?xml version="1.0" encoding="utf-8"?>
+<p:sld xmlns:a="http://schemas.openxmlformats.org/drawingml/2006/main" xmlns:r="http://schemas.openxmlformats.org/officeDocument/2006/relationships" xmlns:p="http://schemas.openxmlformats.org/presentationml/2006/main">
+  <p:cSld>
+    <p:spTree>
+      <p:nvGrpSpPr>
+        <p:cNvPr id="1" name=""/>
+        <p:cNvGrpSpPr/>
+        <p:nvPr/>
+      </p:nvGrpSpPr>
+      <p:grpSpPr>
+        <a:xfrm>
+          <a:off x="0" y="0"/>
+          <a:ext cx="0" cy="0"/>
+          <a:chOff x="0" y="0"/>
+          <a:chExt cx="0" cy="0"/>
+        </a:xfrm>
+      </p:grpSpPr>
+      <p:sp>
+        <p:nvSpPr>
+          <p:cNvPr id="2" name="Title 1"/>
+          <p:cNvSpPr>
+            <a:spLocks noGrp="1"/>
+          </p:cNvSpPr>
+          <p:nvPr>
+            <p:ph type="title"/>
+          </p:nvPr>
+        </p:nvSpPr>
+        <p:spPr/>
+        <p:txBody>
+          <a:bodyPr/>
+          <a:lstStyle/>
+          <a:p>
+            <a:r>
+              <a:rPr lang="bg-BG" dirty="0"/>
+              <a:t>Параметри на функции в </a:t>
+            </a:r>
+            <a:r>
+              <a:rPr lang="en-US" dirty="0" err="1" smtClean="0"/>
+              <a:t>php</a:t>
+            </a:r>
+            <a:r>
+              <a:rPr lang="bg-BG" dirty="0" smtClean="0"/>
+              <a:t> </a:t>
+            </a:r>
+            <a:r>
+              <a:rPr lang="bg-BG" dirty="0" err="1" smtClean="0"/>
+              <a:t>ДЕмо</a:t>
+            </a:r>
+            <a:endParaRPr lang="en-US" dirty="0"/>
+          </a:p>
+        </p:txBody>
+      </p:sp>
+      <p:pic>
+        <p:nvPicPr>
+          <p:cNvPr id="1026" name="Picture 2" descr="http://mathinsight.org/media/image/image/function_machine_parameters.png"/>
+          <p:cNvPicPr>
+            <a:picLocks noChangeAspect="1" noChangeArrowheads="1"/>
+          </p:cNvPicPr>
+          <p:nvPr/>
+        </p:nvPicPr>
+        <p:blipFill>
+          <a:blip r:embed="rId2">
+            <a:extLst>
+              <a:ext uri="{28A0092B-C50C-407E-A947-70E740481C1C}">
+                <a14:useLocalDpi xmlns:a14="http://schemas.microsoft.com/office/drawing/2010/main" val="0"/>
+              </a:ext>
+            </a:extLst>
+          </a:blip>
+          <a:srcRect/>
+          <a:stretch>
+            <a:fillRect/>
+          </a:stretch>
+        </p:blipFill>
+        <p:spPr bwMode="auto">
+          <a:xfrm>
+            <a:off x="3533775" y="2214694"/>
+            <a:ext cx="5124450" cy="4499267"/>
+          </a:xfrm>
+          <a:prstGeom prst="rect">
+            <a:avLst/>
+          </a:prstGeom>
+          <a:noFill/>
+          <a:extLst>
+            <a:ext uri="{909E8E84-426E-40DD-AFC4-6F175D3DCCD1}">
+              <a14:hiddenFill xmlns:a14="http://schemas.microsoft.com/office/drawing/2010/main">
+                <a:solidFill>
+                  <a:srgbClr val="FFFFFF"/>
+                </a:solidFill>
+              </a14:hiddenFill>
+            </a:ext>
+          </a:extLst>
+        </p:spPr>
+      </p:pic>
+    </p:spTree>
+    <p:extLst>
+      <p:ext uri="{BB962C8B-B14F-4D97-AF65-F5344CB8AC3E}">
+        <p14:creationId xmlns:p14="http://schemas.microsoft.com/office/powerpoint/2010/main" val="692940522"/>
+      </p:ext>
+    </p:extLst>
+  </p:cSld>
+  <p:clrMapOvr>
+    <a:masterClrMapping/>
+  </p:clrMapOvr>
+</p:sld>
+</file>
+
+<file path=ppt/slides/slide8.xml><?xml version="1.0" encoding="utf-8"?>
+<p:sld xmlns:a="http://schemas.openxmlformats.org/drawingml/2006/main" xmlns:r="http://schemas.openxmlformats.org/officeDocument/2006/relationships" xmlns:p="http://schemas.openxmlformats.org/presentationml/2006/main">
+  <p:cSld>
+    <p:spTree>
+      <p:nvGrpSpPr>
+        <p:cNvPr id="1" name=""/>
+        <p:cNvGrpSpPr/>
+        <p:nvPr/>
+      </p:nvGrpSpPr>
+      <p:grpSpPr>
+        <a:xfrm>
+          <a:off x="0" y="0"/>
+          <a:ext cx="0" cy="0"/>
+          <a:chOff x="0" y="0"/>
+          <a:chExt cx="0" cy="0"/>
+        </a:xfrm>
+      </p:grpSpPr>
+      <p:sp>
+        <p:nvSpPr>
+          <p:cNvPr id="2" name="Title 1"/>
+          <p:cNvSpPr>
+            <a:spLocks noGrp="1"/>
+          </p:cNvSpPr>
+          <p:nvPr>
+            <p:ph type="title"/>
+          </p:nvPr>
+        </p:nvSpPr>
+        <p:spPr/>
+        <p:txBody>
+          <a:bodyPr/>
+          <a:lstStyle/>
+          <a:p>
+            <a:r>
+              <a:rPr lang="bg-BG" dirty="0" smtClean="0"/>
+              <a:t>Връщане на стойност от функция</a:t>
+            </a:r>
+            <a:endParaRPr lang="en-US" dirty="0"/>
+          </a:p>
+        </p:txBody>
+      </p:sp>
+      <p:sp>
+        <p:nvSpPr>
+          <p:cNvPr id="3" name="Content Placeholder 2"/>
+          <p:cNvSpPr>
+            <a:spLocks noGrp="1"/>
+          </p:cNvSpPr>
+          <p:nvPr>
+            <p:ph sz="quarter" idx="13"/>
+          </p:nvPr>
+        </p:nvSpPr>
+        <p:spPr/>
+        <p:txBody>
+          <a:bodyPr/>
+          <a:lstStyle/>
+          <a:p>
+            <a:r>
+              <a:rPr lang="bg-BG" dirty="0" smtClean="0"/>
+              <a:t>Извършва се с помощта на ключовата дума </a:t>
+            </a:r>
+            <a:r>
+              <a:rPr lang="en-US" dirty="0" smtClean="0"/>
+              <a:t>return</a:t>
+            </a:r>
+          </a:p>
+          <a:p>
+            <a:r>
+              <a:rPr lang="bg-BG" dirty="0" smtClean="0"/>
+              <a:t>Резултатът от функцията представлява променлива</a:t>
+            </a:r>
+          </a:p>
+          <a:p>
+            <a:r>
+              <a:rPr lang="bg-BG" dirty="0" smtClean="0"/>
+              <a:t>Изпълнението на функцията приключва след</a:t>
+            </a:r>
+            <a:r>
+              <a:rPr lang="en-US" dirty="0" smtClean="0"/>
+              <a:t> </a:t>
+            </a:r>
+            <a:r>
+              <a:rPr lang="bg-BG" dirty="0" smtClean="0"/>
+              <a:t>връщането на резултат с </a:t>
+            </a:r>
+            <a:r>
+              <a:rPr lang="en-US" dirty="0" smtClean="0"/>
+              <a:t>return</a:t>
+            </a:r>
+            <a:endParaRPr lang="en-US" dirty="0"/>
+          </a:p>
+        </p:txBody>
+      </p:sp>
+    </p:spTree>
+    <p:extLst>
+      <p:ext uri="{BB962C8B-B14F-4D97-AF65-F5344CB8AC3E}">
+        <p14:creationId xmlns:p14="http://schemas.microsoft.com/office/powerpoint/2010/main" val="707973724"/>
+      </p:ext>
+    </p:extLst>
+  </p:cSld>
+  <p:clrMapOvr>
+    <a:masterClrMapping/>
+  </p:clrMapOvr>
+</p:sld>
+</file>
+
+<file path=ppt/slides/slide9.xml><?xml version="1.0" encoding="utf-8"?>
+<p:sld xmlns:a="http://schemas.openxmlformats.org/drawingml/2006/main" xmlns:r="http://schemas.openxmlformats.org/officeDocument/2006/relationships" xmlns:p="http://schemas.openxmlformats.org/presentationml/2006/main">
+  <p:cSld>
+    <p:spTree>
+      <p:nvGrpSpPr>
+        <p:cNvPr id="1" name=""/>
+        <p:cNvGrpSpPr/>
+        <p:nvPr/>
+      </p:nvGrpSpPr>
+      <p:grpSpPr>
+        <a:xfrm>
+          <a:off x="0" y="0"/>
+          <a:ext cx="0" cy="0"/>
+          <a:chOff x="0" y="0"/>
+          <a:chExt cx="0" cy="0"/>
+        </a:xfrm>
+      </p:grpSpPr>
+      <p:sp>
+        <p:nvSpPr>
+          <p:cNvPr id="2" name="Title 1"/>
+          <p:cNvSpPr>
+            <a:spLocks noGrp="1"/>
+          </p:cNvSpPr>
+          <p:nvPr>
+            <p:ph type="title"/>
+          </p:nvPr>
+        </p:nvSpPr>
+        <p:spPr/>
+        <p:txBody>
+          <a:bodyPr/>
+          <a:lstStyle/>
+          <a:p>
+            <a:r>
+              <a:rPr lang="bg-BG" dirty="0"/>
+              <a:t>Връщане на стойност от </a:t>
+            </a:r>
+            <a:r>
+              <a:rPr lang="bg-BG" dirty="0" smtClean="0"/>
+              <a:t>функция демо</a:t>
+            </a:r>
+            <a:endParaRPr lang="en-US" dirty="0"/>
+          </a:p>
+        </p:txBody>
+      </p:sp>
+      <p:pic>
+        <p:nvPicPr>
+          <p:cNvPr id="2050" name="Picture 2" descr="http://hiyougami.webs.com/return-wallpaper-1920x1080.jpg"/>
+          <p:cNvPicPr>
+            <a:picLocks noChangeAspect="1" noChangeArrowheads="1"/>
+          </p:cNvPicPr>
+          <p:nvPr/>
+        </p:nvPicPr>
+        <p:blipFill>
+          <a:blip r:embed="rId2">
+            <a:extLst>
+              <a:ext uri="{28A0092B-C50C-407E-A947-70E740481C1C}">
+                <a14:useLocalDpi xmlns:a14="http://schemas.microsoft.com/office/drawing/2010/main" val="0"/>
+              </a:ext>
+            </a:extLst>
+          </a:blip>
+          <a:srcRect/>
+          <a:stretch>
+            <a:fillRect/>
+          </a:stretch>
+        </p:blipFill>
+        <p:spPr bwMode="auto">
+          <a:xfrm>
+            <a:off x="2286000" y="2214694"/>
+            <a:ext cx="7620000" cy="4286250"/>
+          </a:xfrm>
+          <a:prstGeom prst="rect">
+            <a:avLst/>
+          </a:prstGeom>
+          <a:noFill/>
+          <a:extLst>
+            <a:ext uri="{909E8E84-426E-40DD-AFC4-6F175D3DCCD1}">
+              <a14:hiddenFill xmlns:a14="http://schemas.microsoft.com/office/drawing/2010/main">
+                <a:solidFill>
+                  <a:srgbClr val="FFFFFF"/>
+                </a:solidFill>
+              </a14:hiddenFill>
+            </a:ext>
+          </a:extLst>
+        </p:spPr>
+      </p:pic>
+    </p:spTree>
+    <p:extLst>
+      <p:ext uri="{BB962C8B-B14F-4D97-AF65-F5344CB8AC3E}">
+        <p14:creationId xmlns:p14="http://schemas.microsoft.com/office/powerpoint/2010/main" val="157906230"/>
       </p:ext>
     </p:extLst>
   </p:cSld>

</xml_diff>